<commit_message>
minor edits to the raw data and updated analysis
</commit_message>
<xml_diff>
--- a/DataRe-Analysis/NewFigureReplaceTable3_v2.pptx
+++ b/DataRe-Analysis/NewFigureReplaceTable3_v2.pptx
@@ -150,13 +150,13 @@
                 <c:formatCode>0%</c:formatCode>
                 <c:ptCount val="3"/>
                 <c:pt idx="0">
-                  <c:v>0.967441860465116</c:v>
+                  <c:v>0.964556962025316</c:v>
                 </c:pt>
                 <c:pt idx="1">
-                  <c:v>0.646511627906977</c:v>
+                  <c:v>0.615189873417721</c:v>
                 </c:pt>
                 <c:pt idx="2">
-                  <c:v>0.613953488372093</c:v>
+                  <c:v>0.579746835443038</c:v>
                 </c:pt>
               </c:numCache>
             </c:numRef>
@@ -3328,7 +3328,7 @@
           <p:nvPr>
             <p:extLst>
               <p:ext uri="{D42A27DB-BD31-4B8C-83A1-F6EECF244321}">
-                <p14:modId xmlns:p14="http://schemas.microsoft.com/office/powerpoint/2010/main" val="1287347885"/>
+                <p14:modId xmlns:p14="http://schemas.microsoft.com/office/powerpoint/2010/main" val="2143274107"/>
               </p:ext>
             </p:extLst>
           </p:nvPr>

</xml_diff>

<commit_message>
Finalizing dataset for sharing.
</commit_message>
<xml_diff>
--- a/DataRe-Analysis/NewFigureReplaceTable3_v2.pptx
+++ b/DataRe-Analysis/NewFigureReplaceTable3_v2.pptx
@@ -239,11 +239,11 @@
           <c:showBubbleSize val="0"/>
         </c:dLbls>
         <c:gapWidth val="150"/>
-        <c:axId val="-2056950792"/>
-        <c:axId val="-2056886120"/>
+        <c:axId val="2060213368"/>
+        <c:axId val="2060216568"/>
       </c:barChart>
       <c:catAx>
-        <c:axId val="-2056950792"/>
+        <c:axId val="2060213368"/>
         <c:scaling>
           <c:orientation val="minMax"/>
         </c:scaling>
@@ -266,7 +266,7 @@
             <a:endParaRPr lang="en-US"/>
           </a:p>
         </c:txPr>
-        <c:crossAx val="-2056886120"/>
+        <c:crossAx val="2060216568"/>
         <c:crosses val="autoZero"/>
         <c:auto val="1"/>
         <c:lblAlgn val="ctr"/>
@@ -274,7 +274,7 @@
         <c:noMultiLvlLbl val="0"/>
       </c:catAx>
       <c:valAx>
-        <c:axId val="-2056886120"/>
+        <c:axId val="2060216568"/>
         <c:scaling>
           <c:orientation val="minMax"/>
           <c:max val="1.0"/>
@@ -298,7 +298,7 @@
             <a:endParaRPr lang="en-US"/>
           </a:p>
         </c:txPr>
-        <c:crossAx val="-2056950792"/>
+        <c:crossAx val="2060213368"/>
         <c:crosses val="autoZero"/>
         <c:crossBetween val="between"/>
       </c:valAx>
@@ -512,7 +512,7 @@
           <a:p>
             <a:fld id="{6AAE921A-02C0-8341-9907-DB79DE7E61AE}" type="datetimeFigureOut">
               <a:rPr lang="en-US" smtClean="0"/>
-              <a:t>7/16/15</a:t>
+              <a:t>7/20/15</a:t>
             </a:fld>
             <a:endParaRPr lang="en-US"/>
           </a:p>
@@ -682,7 +682,7 @@
           <a:p>
             <a:fld id="{6AAE921A-02C0-8341-9907-DB79DE7E61AE}" type="datetimeFigureOut">
               <a:rPr lang="en-US" smtClean="0"/>
-              <a:t>7/16/15</a:t>
+              <a:t>7/20/15</a:t>
             </a:fld>
             <a:endParaRPr lang="en-US"/>
           </a:p>
@@ -862,7 +862,7 @@
           <a:p>
             <a:fld id="{6AAE921A-02C0-8341-9907-DB79DE7E61AE}" type="datetimeFigureOut">
               <a:rPr lang="en-US" smtClean="0"/>
-              <a:t>7/16/15</a:t>
+              <a:t>7/20/15</a:t>
             </a:fld>
             <a:endParaRPr lang="en-US"/>
           </a:p>
@@ -1032,7 +1032,7 @@
           <a:p>
             <a:fld id="{6AAE921A-02C0-8341-9907-DB79DE7E61AE}" type="datetimeFigureOut">
               <a:rPr lang="en-US" smtClean="0"/>
-              <a:t>7/16/15</a:t>
+              <a:t>7/20/15</a:t>
             </a:fld>
             <a:endParaRPr lang="en-US"/>
           </a:p>
@@ -1278,7 +1278,7 @@
           <a:p>
             <a:fld id="{6AAE921A-02C0-8341-9907-DB79DE7E61AE}" type="datetimeFigureOut">
               <a:rPr lang="en-US" smtClean="0"/>
-              <a:t>7/16/15</a:t>
+              <a:t>7/20/15</a:t>
             </a:fld>
             <a:endParaRPr lang="en-US"/>
           </a:p>
@@ -1566,7 +1566,7 @@
           <a:p>
             <a:fld id="{6AAE921A-02C0-8341-9907-DB79DE7E61AE}" type="datetimeFigureOut">
               <a:rPr lang="en-US" smtClean="0"/>
-              <a:t>7/16/15</a:t>
+              <a:t>7/20/15</a:t>
             </a:fld>
             <a:endParaRPr lang="en-US"/>
           </a:p>
@@ -1988,7 +1988,7 @@
           <a:p>
             <a:fld id="{6AAE921A-02C0-8341-9907-DB79DE7E61AE}" type="datetimeFigureOut">
               <a:rPr lang="en-US" smtClean="0"/>
-              <a:t>7/16/15</a:t>
+              <a:t>7/20/15</a:t>
             </a:fld>
             <a:endParaRPr lang="en-US"/>
           </a:p>
@@ -2106,7 +2106,7 @@
           <a:p>
             <a:fld id="{6AAE921A-02C0-8341-9907-DB79DE7E61AE}" type="datetimeFigureOut">
               <a:rPr lang="en-US" smtClean="0"/>
-              <a:t>7/16/15</a:t>
+              <a:t>7/20/15</a:t>
             </a:fld>
             <a:endParaRPr lang="en-US"/>
           </a:p>
@@ -2201,7 +2201,7 @@
           <a:p>
             <a:fld id="{6AAE921A-02C0-8341-9907-DB79DE7E61AE}" type="datetimeFigureOut">
               <a:rPr lang="en-US" smtClean="0"/>
-              <a:t>7/16/15</a:t>
+              <a:t>7/20/15</a:t>
             </a:fld>
             <a:endParaRPr lang="en-US"/>
           </a:p>
@@ -2478,7 +2478,7 @@
           <a:p>
             <a:fld id="{6AAE921A-02C0-8341-9907-DB79DE7E61AE}" type="datetimeFigureOut">
               <a:rPr lang="en-US" smtClean="0"/>
-              <a:t>7/16/15</a:t>
+              <a:t>7/20/15</a:t>
             </a:fld>
             <a:endParaRPr lang="en-US"/>
           </a:p>
@@ -2731,7 +2731,7 @@
           <a:p>
             <a:fld id="{6AAE921A-02C0-8341-9907-DB79DE7E61AE}" type="datetimeFigureOut">
               <a:rPr lang="en-US" smtClean="0"/>
-              <a:t>7/16/15</a:t>
+              <a:t>7/20/15</a:t>
             </a:fld>
             <a:endParaRPr lang="en-US"/>
           </a:p>
@@ -2944,7 +2944,7 @@
           <a:p>
             <a:fld id="{6AAE921A-02C0-8341-9907-DB79DE7E61AE}" type="datetimeFigureOut">
               <a:rPr lang="en-US" smtClean="0"/>
-              <a:t>7/16/15</a:t>
+              <a:t>7/20/15</a:t>
             </a:fld>
             <a:endParaRPr lang="en-US"/>
           </a:p>
@@ -3365,6 +3365,7 @@
           </a:bodyPr>
           <a:lstStyle/>
           <a:p>
+            <a:pPr algn="ctr"/>
             <a:r>
               <a:rPr lang="en-US" sz="1200" b="1" dirty="0" smtClean="0">
                 <a:latin typeface="Arial"/>

</xml_diff>